<commit_message>
Screenshot changed on presentation.
</commit_message>
<xml_diff>
--- a/presentation/Helpdesk/Pintér Dávid/david_pinter_presentation.pptx
+++ b/presentation/Helpdesk/Pintér Dávid/david_pinter_presentation.pptx
@@ -1078,15 +1078,7 @@
           <a:p>
             <a:r>
               <a:rPr lang="hu-HU" baseline="0" dirty="0"/>
-              <a:t>SZEBB KÓD: </a:t>
-            </a:r>
-            <a:r>
-              <a:rPr lang="hu-HU" baseline="0" dirty="0"/>
-              <a:t>CHECKSTYLE + </a:t>
-            </a:r>
-            <a:r>
-              <a:rPr lang="hu-HU" baseline="0" dirty="0"/>
-              <a:t>ATTILA</a:t>
+              <a:t>SZEBB KÓD: CHECKSTYLE + ATTILA</a:t>
             </a:r>
           </a:p>
           <a:p>
@@ -5483,9 +5475,38 @@
           </a:extLst>
         </p:spPr>
       </p:pic>
+      <p:sp>
+        <p:nvSpPr>
+          <p:cNvPr id="13" name="Cím 1"/>
+          <p:cNvSpPr>
+            <a:spLocks noGrp="1"/>
+          </p:cNvSpPr>
+          <p:nvPr>
+            <p:ph type="ctrTitle"/>
+          </p:nvPr>
+        </p:nvSpPr>
+        <p:spPr>
+          <a:xfrm rot="20305361">
+            <a:off x="7446477" y="153351"/>
+            <a:ext cx="1548465" cy="417968"/>
+          </a:xfrm>
+        </p:spPr>
+        <p:txBody>
+          <a:bodyPr>
+            <a:normAutofit/>
+          </a:bodyPr>
+          <a:lstStyle/>
+          <a:p>
+            <a:r>
+              <a:rPr lang="hu-HU" sz="1800" dirty="0"/>
+              <a:t>Helpdesk</a:t>
+            </a:r>
+          </a:p>
+        </p:txBody>
+      </p:sp>
       <p:pic>
         <p:nvPicPr>
-          <p:cNvPr id="11" name="Kép 10"/>
+          <p:cNvPr id="10" name="Kép 9"/>
           <p:cNvPicPr>
             <a:picLocks noChangeAspect="1"/>
           </p:cNvPicPr>
@@ -5499,48 +5520,19 @@
               </a:ext>
             </a:extLst>
           </a:blip>
-          <a:srcRect t="-246" r="42309" b="54284"/>
+          <a:srcRect t="3114"/>
           <a:stretch/>
         </p:blipFill>
         <p:spPr>
           <a:xfrm>
-            <a:off x="4053587" y="2555542"/>
-            <a:ext cx="5090414" cy="2364036"/>
+            <a:off x="4043094" y="2666288"/>
+            <a:ext cx="5100906" cy="2275678"/>
           </a:xfrm>
           <a:prstGeom prst="rect">
             <a:avLst/>
           </a:prstGeom>
         </p:spPr>
       </p:pic>
-      <p:sp>
-        <p:nvSpPr>
-          <p:cNvPr id="13" name="Cím 1"/>
-          <p:cNvSpPr>
-            <a:spLocks noGrp="1"/>
-          </p:cNvSpPr>
-          <p:nvPr>
-            <p:ph type="ctrTitle"/>
-          </p:nvPr>
-        </p:nvSpPr>
-        <p:spPr>
-          <a:xfrm rot="20305361">
-            <a:off x="7446477" y="153351"/>
-            <a:ext cx="1548465" cy="417968"/>
-          </a:xfrm>
-        </p:spPr>
-        <p:txBody>
-          <a:bodyPr>
-            <a:normAutofit/>
-          </a:bodyPr>
-          <a:lstStyle/>
-          <a:p>
-            <a:r>
-              <a:rPr lang="hu-HU" sz="1800" dirty="0"/>
-              <a:t>Helpdesk</a:t>
-            </a:r>
-          </a:p>
-        </p:txBody>
-      </p:sp>
     </p:spTree>
     <p:extLst>
       <p:ext uri="{BB962C8B-B14F-4D97-AF65-F5344CB8AC3E}">
@@ -6738,6 +6730,21 @@
 </file>
 
 <file path=customXml/item1.xml><?xml version="1.0" encoding="utf-8"?>
+<p:properties xmlns:p="http://schemas.microsoft.com/office/2006/metadata/properties" xmlns:xsi="http://www.w3.org/2001/XMLSchema-instance" xmlns:pc="http://schemas.microsoft.com/office/infopath/2007/PartnerControls">
+  <documentManagement/>
+</p:properties>
+</file>
+
+<file path=customXml/item2.xml><?xml version="1.0" encoding="utf-8"?>
+<?mso-contentType ?>
+<FormTemplates xmlns="http://schemas.microsoft.com/sharepoint/v3/contenttype/forms">
+  <Display>DocumentLibraryForm</Display>
+  <Edit>DocumentLibraryForm</Edit>
+  <New>DocumentLibraryForm</New>
+</FormTemplates>
+</file>
+
+<file path=customXml/item3.xml><?xml version="1.0" encoding="utf-8"?>
 <ct:contentTypeSchema xmlns:ct="http://schemas.microsoft.com/office/2006/metadata/contentType" xmlns:ma="http://schemas.microsoft.com/office/2006/metadata/properties/metaAttributes" ct:_="" ma:_="" ma:contentTypeName="Dokumentum" ma:contentTypeID="0x010100AC862C676857C24E8FC2D32B30708833" ma:contentTypeVersion="2" ma:contentTypeDescription="Új dokumentum létrehozása." ma:contentTypeScope="" ma:versionID="56d51952ebb676fe3cf20c5597969f31">
   <xsd:schema xmlns:xsd="http://www.w3.org/2001/XMLSchema" xmlns:xs="http://www.w3.org/2001/XMLSchema" xmlns:p="http://schemas.microsoft.com/office/2006/metadata/properties" xmlns:ns2="9a324a02-be43-499b-8089-7896e70993e7" targetNamespace="http://schemas.microsoft.com/office/2006/metadata/properties" ma:root="true" ma:fieldsID="4fefbcd2855290300f96a0ef710b0fa0" ns2:_="">
     <xsd:import namespace="9a324a02-be43-499b-8089-7896e70993e7"/>
@@ -6885,22 +6892,31 @@
 </ct:contentTypeSchema>
 </file>
 
-<file path=customXml/item2.xml><?xml version="1.0" encoding="utf-8"?>
-<?mso-contentType ?>
-<FormTemplates xmlns="http://schemas.microsoft.com/sharepoint/v3/contenttype/forms">
-  <Display>DocumentLibraryForm</Display>
-  <Edit>DocumentLibraryForm</Edit>
-  <New>DocumentLibraryForm</New>
-</FormTemplates>
+<file path=customXml/itemProps1.xml><?xml version="1.0" encoding="utf-8"?>
+<ds:datastoreItem xmlns:ds="http://schemas.openxmlformats.org/officeDocument/2006/customXml" ds:itemID="{8E1455B4-EFFE-4AEE-ADC2-FE51D16F6234}">
+  <ds:schemaRefs>
+    <ds:schemaRef ds:uri="9a324a02-be43-499b-8089-7896e70993e7"/>
+    <ds:schemaRef ds:uri="http://purl.org/dc/elements/1.1/"/>
+    <ds:schemaRef ds:uri="http://schemas.microsoft.com/office/2006/metadata/properties"/>
+    <ds:schemaRef ds:uri="http://purl.org/dc/terms/"/>
+    <ds:schemaRef ds:uri="http://schemas.openxmlformats.org/package/2006/metadata/core-properties"/>
+    <ds:schemaRef ds:uri="http://purl.org/dc/dcmitype/"/>
+    <ds:schemaRef ds:uri="http://schemas.microsoft.com/office/2006/documentManagement/types"/>
+    <ds:schemaRef ds:uri="http://schemas.microsoft.com/office/infopath/2007/PartnerControls"/>
+    <ds:schemaRef ds:uri="http://www.w3.org/XML/1998/namespace"/>
+  </ds:schemaRefs>
+</ds:datastoreItem>
 </file>
 
-<file path=customXml/item3.xml><?xml version="1.0" encoding="utf-8"?>
-<p:properties xmlns:p="http://schemas.microsoft.com/office/2006/metadata/properties" xmlns:xsi="http://www.w3.org/2001/XMLSchema-instance" xmlns:pc="http://schemas.microsoft.com/office/infopath/2007/PartnerControls">
-  <documentManagement/>
-</p:properties>
+<file path=customXml/itemProps2.xml><?xml version="1.0" encoding="utf-8"?>
+<ds:datastoreItem xmlns:ds="http://schemas.openxmlformats.org/officeDocument/2006/customXml" ds:itemID="{166AD069-051C-46FD-A0CD-BDE143FEA57D}">
+  <ds:schemaRefs>
+    <ds:schemaRef ds:uri="http://schemas.microsoft.com/sharepoint/v3/contenttype/forms"/>
+  </ds:schemaRefs>
+</ds:datastoreItem>
 </file>
 
-<file path=customXml/itemProps1.xml><?xml version="1.0" encoding="utf-8"?>
+<file path=customXml/itemProps3.xml><?xml version="1.0" encoding="utf-8"?>
 <ds:datastoreItem xmlns:ds="http://schemas.openxmlformats.org/officeDocument/2006/customXml" ds:itemID="{C5A1A0B1-1575-4000-BA64-916766809361}">
   <ds:schemaRefs>
     <ds:schemaRef ds:uri="http://schemas.microsoft.com/office/2006/metadata/contentType"/>
@@ -6916,28 +6932,4 @@
     <ds:schemaRef ds:uri="http://schemas.microsoft.com/internal/obd"/>
   </ds:schemaRefs>
 </ds:datastoreItem>
-</file>
-
-<file path=customXml/itemProps2.xml><?xml version="1.0" encoding="utf-8"?>
-<ds:datastoreItem xmlns:ds="http://schemas.openxmlformats.org/officeDocument/2006/customXml" ds:itemID="{166AD069-051C-46FD-A0CD-BDE143FEA57D}">
-  <ds:schemaRefs>
-    <ds:schemaRef ds:uri="http://schemas.microsoft.com/sharepoint/v3/contenttype/forms"/>
-  </ds:schemaRefs>
-</ds:datastoreItem>
-</file>
-
-<file path=customXml/itemProps3.xml><?xml version="1.0" encoding="utf-8"?>
-<ds:datastoreItem xmlns:ds="http://schemas.openxmlformats.org/officeDocument/2006/customXml" ds:itemID="{8E1455B4-EFFE-4AEE-ADC2-FE51D16F6234}">
-  <ds:schemaRefs>
-    <ds:schemaRef ds:uri="9a324a02-be43-499b-8089-7896e70993e7"/>
-    <ds:schemaRef ds:uri="http://purl.org/dc/elements/1.1/"/>
-    <ds:schemaRef ds:uri="http://schemas.microsoft.com/office/2006/metadata/properties"/>
-    <ds:schemaRef ds:uri="http://purl.org/dc/terms/"/>
-    <ds:schemaRef ds:uri="http://schemas.openxmlformats.org/package/2006/metadata/core-properties"/>
-    <ds:schemaRef ds:uri="http://purl.org/dc/dcmitype/"/>
-    <ds:schemaRef ds:uri="http://schemas.microsoft.com/office/2006/documentManagement/types"/>
-    <ds:schemaRef ds:uri="http://schemas.microsoft.com/office/infopath/2007/PartnerControls"/>
-    <ds:schemaRef ds:uri="http://www.w3.org/XML/1998/namespace"/>
-  </ds:schemaRefs>
-</ds:datastoreItem>
 </file>
</xml_diff>